<commit_message>
- added butterfly slides.
</commit_message>
<xml_diff>
--- a/second_semester/secure_webdevelopment/grill_lehner_murrent/Präsentation.pptx
+++ b/second_semester/secure_webdevelopment/grill_lehner_murrent/Präsentation.pptx
@@ -16,8 +16,7 @@
     <p:sldId id="264" r:id="rId10"/>
     <p:sldId id="265" r:id="rId11"/>
     <p:sldId id="267" r:id="rId12"/>
-    <p:sldId id="268" r:id="rId13"/>
-    <p:sldId id="269" r:id="rId14"/>
+    <p:sldId id="269" r:id="rId13"/>
   </p:sldIdLst>
   <p:sldSz cx="12192000" cy="6858000"/>
   <p:notesSz cx="6858000" cy="9144000"/>
@@ -364,7 +363,7 @@
           <a:p>
             <a:fld id="{D57F1E4F-1CFF-5643-939E-02111984F565}" type="slidenum">
               <a:rPr lang="en-US" smtClean="0"/>
-              <a:t>‹Nr.›</a:t>
+              <a:t>‹#›</a:t>
             </a:fld>
             <a:endParaRPr lang="en-US" dirty="0"/>
           </a:p>
@@ -639,7 +638,7 @@
           <a:p>
             <a:fld id="{6C6AE60A-B69C-4790-82F7-3882EDF23186}" type="slidenum">
               <a:rPr lang="de-DE" smtClean="0"/>
-              <a:t>‹Nr.›</a:t>
+              <a:t>‹#›</a:t>
             </a:fld>
             <a:endParaRPr lang="de-DE"/>
           </a:p>
@@ -833,7 +832,7 @@
           <a:p>
             <a:fld id="{6C6AE60A-B69C-4790-82F7-3882EDF23186}" type="slidenum">
               <a:rPr lang="de-DE" smtClean="0"/>
-              <a:t>‹Nr.›</a:t>
+              <a:t>‹#›</a:t>
             </a:fld>
             <a:endParaRPr lang="de-DE"/>
           </a:p>
@@ -1106,7 +1105,7 @@
           <a:p>
             <a:fld id="{6C6AE60A-B69C-4790-82F7-3882EDF23186}" type="slidenum">
               <a:rPr lang="de-DE" smtClean="0"/>
-              <a:t>‹Nr.›</a:t>
+              <a:t>‹#›</a:t>
             </a:fld>
             <a:endParaRPr lang="de-DE"/>
           </a:p>
@@ -1447,7 +1446,7 @@
           <a:p>
             <a:fld id="{6C6AE60A-B69C-4790-82F7-3882EDF23186}" type="slidenum">
               <a:rPr lang="de-DE" smtClean="0"/>
-              <a:t>‹Nr.›</a:t>
+              <a:t>‹#›</a:t>
             </a:fld>
             <a:endParaRPr lang="de-DE"/>
           </a:p>
@@ -2070,7 +2069,7 @@
           <a:p>
             <a:fld id="{6C6AE60A-B69C-4790-82F7-3882EDF23186}" type="slidenum">
               <a:rPr lang="de-DE" smtClean="0"/>
-              <a:t>‹Nr.›</a:t>
+              <a:t>‹#›</a:t>
             </a:fld>
             <a:endParaRPr lang="de-DE"/>
           </a:p>
@@ -2930,7 +2929,7 @@
           <a:p>
             <a:fld id="{6C6AE60A-B69C-4790-82F7-3882EDF23186}" type="slidenum">
               <a:rPr lang="de-DE" smtClean="0"/>
-              <a:t>‹Nr.›</a:t>
+              <a:t>‹#›</a:t>
             </a:fld>
             <a:endParaRPr lang="de-DE"/>
           </a:p>
@@ -3100,7 +3099,7 @@
           <a:p>
             <a:fld id="{6C6AE60A-B69C-4790-82F7-3882EDF23186}" type="slidenum">
               <a:rPr lang="de-DE" smtClean="0"/>
-              <a:t>‹Nr.›</a:t>
+              <a:t>‹#›</a:t>
             </a:fld>
             <a:endParaRPr lang="de-DE"/>
           </a:p>
@@ -3280,7 +3279,7 @@
           <a:p>
             <a:fld id="{6C6AE60A-B69C-4790-82F7-3882EDF23186}" type="slidenum">
               <a:rPr lang="de-DE" smtClean="0"/>
-              <a:t>‹Nr.›</a:t>
+              <a:t>‹#›</a:t>
             </a:fld>
             <a:endParaRPr lang="de-DE"/>
           </a:p>
@@ -3450,7 +3449,7 @@
           <a:p>
             <a:fld id="{6C6AE60A-B69C-4790-82F7-3882EDF23186}" type="slidenum">
               <a:rPr lang="de-DE" smtClean="0"/>
-              <a:t>‹Nr.›</a:t>
+              <a:t>‹#›</a:t>
             </a:fld>
             <a:endParaRPr lang="de-DE"/>
           </a:p>
@@ -3697,7 +3696,7 @@
           <a:p>
             <a:fld id="{6C6AE60A-B69C-4790-82F7-3882EDF23186}" type="slidenum">
               <a:rPr lang="de-DE" smtClean="0"/>
-              <a:t>‹Nr.›</a:t>
+              <a:t>‹#›</a:t>
             </a:fld>
             <a:endParaRPr lang="de-DE"/>
           </a:p>
@@ -3989,7 +3988,7 @@
           <a:p>
             <a:fld id="{6C6AE60A-B69C-4790-82F7-3882EDF23186}" type="slidenum">
               <a:rPr lang="de-DE" smtClean="0"/>
-              <a:t>‹Nr.›</a:t>
+              <a:t>‹#›</a:t>
             </a:fld>
             <a:endParaRPr lang="de-DE"/>
           </a:p>
@@ -4433,7 +4432,7 @@
           <a:p>
             <a:fld id="{6C6AE60A-B69C-4790-82F7-3882EDF23186}" type="slidenum">
               <a:rPr lang="de-DE" smtClean="0"/>
-              <a:t>‹Nr.›</a:t>
+              <a:t>‹#›</a:t>
             </a:fld>
             <a:endParaRPr lang="de-DE"/>
           </a:p>
@@ -4551,7 +4550,7 @@
           <a:p>
             <a:fld id="{6C6AE60A-B69C-4790-82F7-3882EDF23186}" type="slidenum">
               <a:rPr lang="de-DE" smtClean="0"/>
-              <a:t>‹Nr.›</a:t>
+              <a:t>‹#›</a:t>
             </a:fld>
             <a:endParaRPr lang="de-DE"/>
           </a:p>
@@ -4646,7 +4645,7 @@
           <a:p>
             <a:fld id="{6C6AE60A-B69C-4790-82F7-3882EDF23186}" type="slidenum">
               <a:rPr lang="de-DE" smtClean="0"/>
-              <a:t>‹Nr.›</a:t>
+              <a:t>‹#›</a:t>
             </a:fld>
             <a:endParaRPr lang="de-DE"/>
           </a:p>
@@ -4925,7 +4924,7 @@
           <a:p>
             <a:fld id="{6C6AE60A-B69C-4790-82F7-3882EDF23186}" type="slidenum">
               <a:rPr lang="de-DE" smtClean="0"/>
-              <a:t>‹Nr.›</a:t>
+              <a:t>‹#›</a:t>
             </a:fld>
             <a:endParaRPr lang="de-DE"/>
           </a:p>
@@ -5200,7 +5199,7 @@
           <a:p>
             <a:fld id="{6C6AE60A-B69C-4790-82F7-3882EDF23186}" type="slidenum">
               <a:rPr lang="de-DE" smtClean="0"/>
-              <a:t>‹Nr.›</a:t>
+              <a:t>‹#›</a:t>
             </a:fld>
             <a:endParaRPr lang="de-DE"/>
           </a:p>
@@ -5666,7 +5665,7 @@
           <a:p>
             <a:fld id="{6C6AE60A-B69C-4790-82F7-3882EDF23186}" type="slidenum">
               <a:rPr lang="de-DE" smtClean="0"/>
-              <a:t>‹Nr.›</a:t>
+              <a:t>‹#›</a:t>
             </a:fld>
             <a:endParaRPr lang="de-DE"/>
           </a:p>
@@ -6223,13 +6222,13 @@
   <p:clrMapOvr>
     <a:masterClrMapping/>
   </p:clrMapOvr>
-  <mc:AlternateContent xmlns:mc="http://schemas.openxmlformats.org/markup-compatibility/2006">
-    <mc:Choice xmlns:p14="http://schemas.microsoft.com/office/powerpoint/2010/main" Requires="p14">
+  <mc:AlternateContent xmlns:mc="http://schemas.openxmlformats.org/markup-compatibility/2006" xmlns:p14="http://schemas.microsoft.com/office/powerpoint/2010/main">
+    <mc:Choice Requires="p14">
       <p:transition spd="med" p14:dur="700">
         <p:fade/>
       </p:transition>
     </mc:Choice>
-    <mc:Fallback>
+    <mc:Fallback xmlns="">
       <p:transition spd="med">
         <p:fade/>
       </p:transition>
@@ -6304,6 +6303,88 @@
           <a:bodyPr/>
           <a:lstStyle/>
           <a:p>
+            <a:pPr lvl="0"/>
+            <a:r>
+              <a:rPr lang="de-AT" dirty="0" smtClean="0"/>
+              <a:t>In /</a:t>
+            </a:r>
+            <a:r>
+              <a:rPr lang="de-AT" dirty="0" err="1" smtClean="0"/>
+              <a:t>usr</a:t>
+            </a:r>
+            <a:r>
+              <a:rPr lang="de-AT" dirty="0" smtClean="0"/>
+              <a:t>/</a:t>
+            </a:r>
+            <a:r>
+              <a:rPr lang="de-AT" dirty="0" err="1" smtClean="0"/>
+              <a:t>local</a:t>
+            </a:r>
+            <a:r>
+              <a:rPr lang="de-AT" dirty="0"/>
+              <a:t> </a:t>
+            </a:r>
+            <a:r>
+              <a:rPr lang="de-AT" dirty="0" err="1" smtClean="0"/>
+              <a:t>gzip</a:t>
+            </a:r>
+            <a:r>
+              <a:rPr lang="de-AT" dirty="0" smtClean="0"/>
+              <a:t> </a:t>
+            </a:r>
+            <a:r>
+              <a:rPr lang="de-AT" dirty="0" err="1" smtClean="0"/>
+              <a:t>file</a:t>
+            </a:r>
+            <a:r>
+              <a:rPr lang="de-AT" dirty="0" smtClean="0"/>
+              <a:t> entpacken (</a:t>
+            </a:r>
+            <a:r>
+              <a:rPr lang="en-US" dirty="0"/>
+              <a:t>tar -</a:t>
+            </a:r>
+            <a:r>
+              <a:rPr lang="en-US" dirty="0" err="1"/>
+              <a:t>zxvpf</a:t>
+            </a:r>
+            <a:r>
+              <a:rPr lang="en-US" dirty="0"/>
+              <a:t> butterfly_1.x.tar.gz --directory </a:t>
+            </a:r>
+            <a:r>
+              <a:rPr lang="en-US" dirty="0" smtClean="0"/>
+              <a:t>/</a:t>
+            </a:r>
+            <a:r>
+              <a:rPr lang="de-AT" dirty="0" smtClean="0"/>
+              <a:t>)</a:t>
+            </a:r>
+          </a:p>
+          <a:p>
+            <a:r>
+              <a:rPr lang="en-US" dirty="0"/>
+              <a:t>/usr/local/butterfly/start/start.sh</a:t>
+            </a:r>
+            <a:endParaRPr lang="de-AT" dirty="0"/>
+          </a:p>
+          <a:p>
+            <a:pPr lvl="0"/>
+            <a:r>
+              <a:rPr lang="de-AT" dirty="0" smtClean="0"/>
+              <a:t>Wichtig: 2 User anlegen (</a:t>
+            </a:r>
+            <a:r>
+              <a:rPr lang="en-US" dirty="0" smtClean="0"/>
+              <a:t>bfly1, bfly2</a:t>
+            </a:r>
+            <a:r>
+              <a:rPr lang="de-AT" dirty="0" smtClean="0"/>
+              <a:t>)</a:t>
+            </a:r>
+          </a:p>
+          <a:p>
+            <a:pPr lvl="0"/>
             <a:endParaRPr lang="de-AT" dirty="0"/>
           </a:p>
         </p:txBody>
@@ -6318,13 +6399,13 @@
   <p:clrMapOvr>
     <a:masterClrMapping/>
   </p:clrMapOvr>
-  <mc:AlternateContent xmlns:mc="http://schemas.openxmlformats.org/markup-compatibility/2006">
-    <mc:Choice xmlns:p14="http://schemas.microsoft.com/office/powerpoint/2010/main" Requires="p14">
+  <mc:AlternateContent xmlns:mc="http://schemas.openxmlformats.org/markup-compatibility/2006" xmlns:p14="http://schemas.microsoft.com/office/powerpoint/2010/main">
+    <mc:Choice Requires="p14">
       <p:transition spd="med" p14:dur="700">
         <p:fade/>
       </p:transition>
     </mc:Choice>
-    <mc:Fallback>
+    <mc:Fallback xmlns="">
       <p:transition spd="med">
         <p:fade/>
       </p:transition>
@@ -6395,6 +6476,24 @@
           <a:bodyPr/>
           <a:lstStyle/>
           <a:p>
+            <a:r>
+              <a:rPr lang="de-AT" dirty="0" smtClean="0"/>
+              <a:t>Ubuntu Server</a:t>
+            </a:r>
+          </a:p>
+          <a:p>
+            <a:r>
+              <a:rPr lang="de-AT" dirty="0" smtClean="0"/>
+              <a:t>MySQL Problem (</a:t>
+            </a:r>
+            <a:r>
+              <a:rPr lang="de-AT" dirty="0" err="1" smtClean="0"/>
+              <a:t>Process</a:t>
+            </a:r>
+            <a:r>
+              <a:rPr lang="de-AT" dirty="0" smtClean="0"/>
+              <a:t> ID)</a:t>
+            </a:r>
             <a:endParaRPr lang="de-AT" dirty="0"/>
           </a:p>
         </p:txBody>
@@ -6409,13 +6508,13 @@
   <p:clrMapOvr>
     <a:masterClrMapping/>
   </p:clrMapOvr>
-  <mc:AlternateContent xmlns:mc="http://schemas.openxmlformats.org/markup-compatibility/2006">
-    <mc:Choice xmlns:p14="http://schemas.microsoft.com/office/powerpoint/2010/main" Requires="p14">
+  <mc:AlternateContent xmlns:mc="http://schemas.openxmlformats.org/markup-compatibility/2006" xmlns:p14="http://schemas.microsoft.com/office/powerpoint/2010/main">
+    <mc:Choice Requires="p14">
       <p:transition spd="med" p14:dur="700">
         <p:fade/>
       </p:transition>
     </mc:Choice>
-    <mc:Fallback>
+    <mc:Fallback xmlns="">
       <p:transition spd="med">
         <p:fade/>
       </p:transition>
@@ -6458,101 +6557,6 @@
             <p:ph type="title"/>
           </p:nvPr>
         </p:nvSpPr>
-        <p:spPr/>
-        <p:txBody>
-          <a:bodyPr/>
-          <a:lstStyle/>
-          <a:p>
-            <a:r>
-              <a:rPr lang="de-DE" dirty="0" smtClean="0"/>
-              <a:t>Verwendung </a:t>
-            </a:r>
-            <a:r>
-              <a:rPr lang="de-DE" dirty="0" err="1" smtClean="0"/>
-              <a:t>ButterFly</a:t>
-            </a:r>
-            <a:endParaRPr lang="de-AT" dirty="0"/>
-          </a:p>
-        </p:txBody>
-      </p:sp>
-      <p:sp>
-        <p:nvSpPr>
-          <p:cNvPr id="3" name="Inhaltsplatzhalter 2"/>
-          <p:cNvSpPr>
-            <a:spLocks noGrp="1"/>
-          </p:cNvSpPr>
-          <p:nvPr>
-            <p:ph idx="1"/>
-          </p:nvPr>
-        </p:nvSpPr>
-        <p:spPr/>
-        <p:txBody>
-          <a:bodyPr/>
-          <a:lstStyle/>
-          <a:p>
-            <a:endParaRPr lang="de-AT"/>
-          </a:p>
-        </p:txBody>
-      </p:sp>
-    </p:spTree>
-    <p:extLst>
-      <p:ext uri="{BB962C8B-B14F-4D97-AF65-F5344CB8AC3E}">
-        <p14:creationId xmlns:p14="http://schemas.microsoft.com/office/powerpoint/2010/main" val="4002205708"/>
-      </p:ext>
-    </p:extLst>
-  </p:cSld>
-  <p:clrMapOvr>
-    <a:masterClrMapping/>
-  </p:clrMapOvr>
-  <mc:AlternateContent xmlns:mc="http://schemas.openxmlformats.org/markup-compatibility/2006">
-    <mc:Choice xmlns:p14="http://schemas.microsoft.com/office/powerpoint/2010/main" Requires="p14">
-      <p:transition spd="med" p14:dur="700">
-        <p:fade/>
-      </p:transition>
-    </mc:Choice>
-    <mc:Fallback>
-      <p:transition spd="med">
-        <p:fade/>
-      </p:transition>
-    </mc:Fallback>
-  </mc:AlternateContent>
-  <p:timing>
-    <p:tnLst>
-      <p:par>
-        <p:cTn id="1" dur="indefinite" restart="never" nodeType="tmRoot"/>
-      </p:par>
-    </p:tnLst>
-  </p:timing>
-</p:sld>
-</file>
-
-<file path=ppt/slides/slide13.xml><?xml version="1.0" encoding="utf-8"?>
-<p:sld xmlns:a="http://schemas.openxmlformats.org/drawingml/2006/main" xmlns:r="http://schemas.openxmlformats.org/officeDocument/2006/relationships" xmlns:p="http://schemas.openxmlformats.org/presentationml/2006/main">
-  <p:cSld>
-    <p:spTree>
-      <p:nvGrpSpPr>
-        <p:cNvPr id="1" name=""/>
-        <p:cNvGrpSpPr/>
-        <p:nvPr/>
-      </p:nvGrpSpPr>
-      <p:grpSpPr>
-        <a:xfrm>
-          <a:off x="0" y="0"/>
-          <a:ext cx="0" cy="0"/>
-          <a:chOff x="0" y="0"/>
-          <a:chExt cx="0" cy="0"/>
-        </a:xfrm>
-      </p:grpSpPr>
-      <p:sp>
-        <p:nvSpPr>
-          <p:cNvPr id="2" name="Titel 1"/>
-          <p:cNvSpPr>
-            <a:spLocks noGrp="1"/>
-          </p:cNvSpPr>
-          <p:nvPr>
-            <p:ph type="title"/>
-          </p:nvPr>
-        </p:nvSpPr>
         <p:spPr>
           <a:xfrm>
             <a:off x="2424000" y="3142801"/>
@@ -6585,13 +6589,13 @@
   <p:clrMapOvr>
     <a:masterClrMapping/>
   </p:clrMapOvr>
-  <mc:AlternateContent xmlns:mc="http://schemas.openxmlformats.org/markup-compatibility/2006">
-    <mc:Choice xmlns:p14="http://schemas.microsoft.com/office/powerpoint/2010/main" Requires="p14">
+  <mc:AlternateContent xmlns:mc="http://schemas.openxmlformats.org/markup-compatibility/2006" xmlns:p14="http://schemas.microsoft.com/office/powerpoint/2010/main">
+    <mc:Choice Requires="p14">
       <p:transition spd="med" p14:dur="700">
         <p:fade/>
       </p:transition>
     </mc:Choice>
-    <mc:Fallback>
+    <mc:Fallback xmlns="">
       <p:transition spd="med">
         <p:fade/>
       </p:transition>
@@ -6756,13 +6760,13 @@
   <p:clrMapOvr>
     <a:masterClrMapping/>
   </p:clrMapOvr>
-  <mc:AlternateContent xmlns:mc="http://schemas.openxmlformats.org/markup-compatibility/2006">
-    <mc:Choice xmlns:p14="http://schemas.microsoft.com/office/powerpoint/2010/main" Requires="p14">
+  <mc:AlternateContent xmlns:mc="http://schemas.openxmlformats.org/markup-compatibility/2006" xmlns:p14="http://schemas.microsoft.com/office/powerpoint/2010/main">
+    <mc:Choice Requires="p14">
       <p:transition spd="med" p14:dur="700">
         <p:fade/>
       </p:transition>
     </mc:Choice>
-    <mc:Fallback>
+    <mc:Fallback xmlns="">
       <p:transition spd="med">
         <p:fade/>
       </p:transition>
@@ -6887,13 +6891,13 @@
   <p:clrMapOvr>
     <a:masterClrMapping/>
   </p:clrMapOvr>
-  <mc:AlternateContent xmlns:mc="http://schemas.openxmlformats.org/markup-compatibility/2006">
-    <mc:Choice xmlns:p14="http://schemas.microsoft.com/office/powerpoint/2010/main" Requires="p14">
+  <mc:AlternateContent xmlns:mc="http://schemas.openxmlformats.org/markup-compatibility/2006" xmlns:p14="http://schemas.microsoft.com/office/powerpoint/2010/main">
+    <mc:Choice Requires="p14">
       <p:transition spd="med" p14:dur="700">
         <p:fade/>
       </p:transition>
     </mc:Choice>
-    <mc:Fallback>
+    <mc:Fallback xmlns="">
       <p:transition spd="med">
         <p:fade/>
       </p:transition>
@@ -6985,11 +6989,7 @@
           <a:p>
             <a:r>
               <a:rPr lang="de-DE" dirty="0" smtClean="0"/>
-              <a:t>Apache Web </a:t>
-            </a:r>
-            <a:r>
-              <a:rPr lang="de-DE" dirty="0" smtClean="0"/>
-              <a:t>Server mit PHP Extension</a:t>
+              <a:t>Apache Web Server mit PHP Extension</a:t>
             </a:r>
           </a:p>
           <a:p>
@@ -7019,13 +7019,13 @@
   <p:clrMapOvr>
     <a:masterClrMapping/>
   </p:clrMapOvr>
-  <mc:AlternateContent xmlns:mc="http://schemas.openxmlformats.org/markup-compatibility/2006">
-    <mc:Choice xmlns:p14="http://schemas.microsoft.com/office/powerpoint/2010/main" Requires="p14">
+  <mc:AlternateContent xmlns:mc="http://schemas.openxmlformats.org/markup-compatibility/2006" xmlns:p14="http://schemas.microsoft.com/office/powerpoint/2010/main">
+    <mc:Choice Requires="p14">
       <p:transition spd="med" p14:dur="700">
         <p:fade/>
       </p:transition>
     </mc:Choice>
-    <mc:Fallback>
+    <mc:Fallback xmlns="">
       <p:transition spd="med">
         <p:fade/>
       </p:transition>
@@ -7206,13 +7206,13 @@
   <p:clrMapOvr>
     <a:masterClrMapping/>
   </p:clrMapOvr>
-  <mc:AlternateContent xmlns:mc="http://schemas.openxmlformats.org/markup-compatibility/2006">
-    <mc:Choice xmlns:p14="http://schemas.microsoft.com/office/powerpoint/2010/main" Requires="p14">
+  <mc:AlternateContent xmlns:mc="http://schemas.openxmlformats.org/markup-compatibility/2006" xmlns:p14="http://schemas.microsoft.com/office/powerpoint/2010/main">
+    <mc:Choice Requires="p14">
       <p:transition spd="med" p14:dur="700">
         <p:fade/>
       </p:transition>
     </mc:Choice>
-    <mc:Fallback>
+    <mc:Fallback xmlns="">
       <p:transition spd="med">
         <p:fade/>
       </p:transition>
@@ -7308,13 +7308,13 @@
   <p:clrMapOvr>
     <a:masterClrMapping/>
   </p:clrMapOvr>
-  <mc:AlternateContent xmlns:mc="http://schemas.openxmlformats.org/markup-compatibility/2006">
-    <mc:Choice xmlns:p14="http://schemas.microsoft.com/office/powerpoint/2010/main" Requires="p14">
+  <mc:AlternateContent xmlns:mc="http://schemas.openxmlformats.org/markup-compatibility/2006" xmlns:p14="http://schemas.microsoft.com/office/powerpoint/2010/main">
+    <mc:Choice Requires="p14">
       <p:transition spd="med" p14:dur="700">
         <p:fade/>
       </p:transition>
     </mc:Choice>
-    <mc:Fallback>
+    <mc:Fallback xmlns="">
       <p:transition spd="med">
         <p:fade/>
       </p:transition>
@@ -7389,13 +7389,13 @@
   <p:clrMapOvr>
     <a:masterClrMapping/>
   </p:clrMapOvr>
-  <mc:AlternateContent xmlns:mc="http://schemas.openxmlformats.org/markup-compatibility/2006">
-    <mc:Choice xmlns:p14="http://schemas.microsoft.com/office/powerpoint/2010/main" Requires="p14">
+  <mc:AlternateContent xmlns:mc="http://schemas.openxmlformats.org/markup-compatibility/2006" xmlns:p14="http://schemas.microsoft.com/office/powerpoint/2010/main">
+    <mc:Choice Requires="p14">
       <p:transition spd="med" p14:dur="700">
         <p:fade/>
       </p:transition>
     </mc:Choice>
-    <mc:Fallback>
+    <mc:Fallback xmlns="">
       <p:transition spd="med">
         <p:fade/>
       </p:transition>
@@ -7453,20 +7453,287 @@
       </p:sp>
       <p:sp>
         <p:nvSpPr>
-          <p:cNvPr id="3" name="Inhaltsplatzhalter 2"/>
-          <p:cNvSpPr>
-            <a:spLocks noGrp="1"/>
-          </p:cNvSpPr>
-          <p:nvPr>
-            <p:ph idx="1"/>
-          </p:nvPr>
-        </p:nvSpPr>
-        <p:spPr/>
-        <p:txBody>
-          <a:bodyPr/>
-          <a:lstStyle/>
-          <a:p>
-            <a:endParaRPr lang="de-AT"/>
+          <p:cNvPr id="4" name="Inhaltsplatzhalter 2"/>
+          <p:cNvSpPr txBox="1">
+            <a:spLocks/>
+          </p:cNvSpPr>
+          <p:nvPr/>
+        </p:nvSpPr>
+        <p:spPr>
+          <a:xfrm>
+            <a:off x="1487488" y="2420888"/>
+            <a:ext cx="7315200" cy="2963423"/>
+          </a:xfrm>
+          <a:prstGeom prst="rect">
+            <a:avLst/>
+          </a:prstGeom>
+        </p:spPr>
+        <p:txBody>
+          <a:bodyPr vert="horz" lIns="91440" tIns="45720" rIns="91440" bIns="45720" rtlCol="0">
+            <a:normAutofit lnSpcReduction="10000"/>
+          </a:bodyPr>
+          <a:lstStyle>
+            <a:lvl1pPr marL="342900" indent="-342900" algn="l" defTabSz="457200" rtl="0" eaLnBrk="1" latinLnBrk="0" hangingPunct="1">
+              <a:spcBef>
+                <a:spcPts val="1000"/>
+              </a:spcBef>
+              <a:spcAft>
+                <a:spcPts val="0"/>
+              </a:spcAft>
+              <a:buClr>
+                <a:schemeClr val="bg2">
+                  <a:lumMod val="40000"/>
+                  <a:lumOff val="60000"/>
+                </a:schemeClr>
+              </a:buClr>
+              <a:buSzPct val="80000"/>
+              <a:buFont typeface="Wingdings 3" charset="2"/>
+              <a:buChar char=""/>
+              <a:defRPr sz="2000" b="0" i="0" kern="1200">
+                <a:solidFill>
+                  <a:schemeClr val="tx1"/>
+                </a:solidFill>
+                <a:latin typeface="+mj-lt"/>
+                <a:ea typeface="+mj-ea"/>
+                <a:cs typeface="+mj-cs"/>
+              </a:defRPr>
+            </a:lvl1pPr>
+            <a:lvl2pPr marL="742950" indent="-285750" algn="l" defTabSz="457200" rtl="0" eaLnBrk="1" latinLnBrk="0" hangingPunct="1">
+              <a:spcBef>
+                <a:spcPts val="1000"/>
+              </a:spcBef>
+              <a:spcAft>
+                <a:spcPts val="0"/>
+              </a:spcAft>
+              <a:buClr>
+                <a:schemeClr val="bg2">
+                  <a:lumMod val="40000"/>
+                  <a:lumOff val="60000"/>
+                </a:schemeClr>
+              </a:buClr>
+              <a:buSzPct val="80000"/>
+              <a:buFont typeface="Wingdings 3" charset="2"/>
+              <a:buChar char=""/>
+              <a:defRPr sz="1800" b="0" i="0" kern="1200">
+                <a:solidFill>
+                  <a:schemeClr val="tx1"/>
+                </a:solidFill>
+                <a:latin typeface="+mj-lt"/>
+                <a:ea typeface="+mj-ea"/>
+                <a:cs typeface="+mj-cs"/>
+              </a:defRPr>
+            </a:lvl2pPr>
+            <a:lvl3pPr marL="1143000" indent="-228600" algn="l" defTabSz="457200" rtl="0" eaLnBrk="1" latinLnBrk="0" hangingPunct="1">
+              <a:spcBef>
+                <a:spcPts val="1000"/>
+              </a:spcBef>
+              <a:spcAft>
+                <a:spcPts val="0"/>
+              </a:spcAft>
+              <a:buClr>
+                <a:schemeClr val="bg2">
+                  <a:lumMod val="40000"/>
+                  <a:lumOff val="60000"/>
+                </a:schemeClr>
+              </a:buClr>
+              <a:buSzPct val="80000"/>
+              <a:buFont typeface="Wingdings 3" charset="2"/>
+              <a:buChar char=""/>
+              <a:defRPr sz="1600" b="0" i="0" kern="1200">
+                <a:solidFill>
+                  <a:schemeClr val="tx1"/>
+                </a:solidFill>
+                <a:latin typeface="+mj-lt"/>
+                <a:ea typeface="+mj-ea"/>
+                <a:cs typeface="+mj-cs"/>
+              </a:defRPr>
+            </a:lvl3pPr>
+            <a:lvl4pPr marL="1600200" indent="-228600" algn="l" defTabSz="457200" rtl="0" eaLnBrk="1" latinLnBrk="0" hangingPunct="1">
+              <a:spcBef>
+                <a:spcPts val="1000"/>
+              </a:spcBef>
+              <a:spcAft>
+                <a:spcPts val="0"/>
+              </a:spcAft>
+              <a:buClr>
+                <a:schemeClr val="bg2">
+                  <a:lumMod val="40000"/>
+                  <a:lumOff val="60000"/>
+                </a:schemeClr>
+              </a:buClr>
+              <a:buSzPct val="80000"/>
+              <a:buFont typeface="Wingdings 3" charset="2"/>
+              <a:buChar char=""/>
+              <a:defRPr sz="1400" b="0" i="0" kern="1200">
+                <a:solidFill>
+                  <a:schemeClr val="tx1"/>
+                </a:solidFill>
+                <a:latin typeface="+mj-lt"/>
+                <a:ea typeface="+mj-ea"/>
+                <a:cs typeface="+mj-cs"/>
+              </a:defRPr>
+            </a:lvl4pPr>
+            <a:lvl5pPr marL="2057400" indent="-228600" algn="l" defTabSz="457200" rtl="0" eaLnBrk="1" latinLnBrk="0" hangingPunct="1">
+              <a:spcBef>
+                <a:spcPts val="1000"/>
+              </a:spcBef>
+              <a:spcAft>
+                <a:spcPts val="0"/>
+              </a:spcAft>
+              <a:buClr>
+                <a:schemeClr val="bg2">
+                  <a:lumMod val="40000"/>
+                  <a:lumOff val="60000"/>
+                </a:schemeClr>
+              </a:buClr>
+              <a:buSzPct val="80000"/>
+              <a:buFont typeface="Wingdings 3" charset="2"/>
+              <a:buChar char=""/>
+              <a:defRPr sz="1400" b="0" i="0" kern="1200">
+                <a:solidFill>
+                  <a:schemeClr val="tx1"/>
+                </a:solidFill>
+                <a:latin typeface="+mj-lt"/>
+                <a:ea typeface="+mj-ea"/>
+                <a:cs typeface="+mj-cs"/>
+              </a:defRPr>
+            </a:lvl5pPr>
+            <a:lvl6pPr marL="2506000" indent="-228600" algn="l" defTabSz="457200" rtl="0" eaLnBrk="1" latinLnBrk="0" hangingPunct="1">
+              <a:spcBef>
+                <a:spcPts val="1000"/>
+              </a:spcBef>
+              <a:spcAft>
+                <a:spcPts val="0"/>
+              </a:spcAft>
+              <a:buClr>
+                <a:schemeClr val="bg2">
+                  <a:lumMod val="40000"/>
+                  <a:lumOff val="60000"/>
+                </a:schemeClr>
+              </a:buClr>
+              <a:buSzPct val="80000"/>
+              <a:buFont typeface="Wingdings 3" charset="2"/>
+              <a:buChar char=""/>
+              <a:defRPr sz="1400" b="0" i="0" kern="1200">
+                <a:solidFill>
+                  <a:schemeClr val="tx1"/>
+                </a:solidFill>
+                <a:latin typeface="+mj-lt"/>
+                <a:ea typeface="+mj-ea"/>
+                <a:cs typeface="+mj-cs"/>
+              </a:defRPr>
+            </a:lvl6pPr>
+            <a:lvl7pPr marL="2971800" indent="-228600" algn="l" defTabSz="457200" rtl="0" eaLnBrk="1" latinLnBrk="0" hangingPunct="1">
+              <a:spcBef>
+                <a:spcPts val="1000"/>
+              </a:spcBef>
+              <a:spcAft>
+                <a:spcPts val="0"/>
+              </a:spcAft>
+              <a:buClr>
+                <a:schemeClr val="bg2">
+                  <a:lumMod val="40000"/>
+                  <a:lumOff val="60000"/>
+                </a:schemeClr>
+              </a:buClr>
+              <a:buSzPct val="80000"/>
+              <a:buFont typeface="Wingdings 3" charset="2"/>
+              <a:buChar char=""/>
+              <a:defRPr sz="1400" b="0" i="0" kern="1200">
+                <a:solidFill>
+                  <a:schemeClr val="tx1"/>
+                </a:solidFill>
+                <a:latin typeface="+mj-lt"/>
+                <a:ea typeface="+mj-ea"/>
+                <a:cs typeface="+mj-cs"/>
+              </a:defRPr>
+            </a:lvl7pPr>
+            <a:lvl8pPr marL="3429000" indent="-228600" algn="l" defTabSz="457200" rtl="0" eaLnBrk="1" latinLnBrk="0" hangingPunct="1">
+              <a:spcBef>
+                <a:spcPts val="1000"/>
+              </a:spcBef>
+              <a:spcAft>
+                <a:spcPts val="0"/>
+              </a:spcAft>
+              <a:buClr>
+                <a:schemeClr val="bg2">
+                  <a:lumMod val="40000"/>
+                  <a:lumOff val="60000"/>
+                </a:schemeClr>
+              </a:buClr>
+              <a:buSzPct val="80000"/>
+              <a:buFont typeface="Wingdings 3" charset="2"/>
+              <a:buChar char=""/>
+              <a:defRPr sz="1400" b="0" i="0" kern="1200">
+                <a:solidFill>
+                  <a:schemeClr val="tx1"/>
+                </a:solidFill>
+                <a:latin typeface="+mj-lt"/>
+                <a:ea typeface="+mj-ea"/>
+                <a:cs typeface="+mj-cs"/>
+              </a:defRPr>
+            </a:lvl8pPr>
+            <a:lvl9pPr marL="3886200" indent="-228600" algn="l" defTabSz="457200" rtl="0" eaLnBrk="1" latinLnBrk="0" hangingPunct="1">
+              <a:spcBef>
+                <a:spcPts val="1000"/>
+              </a:spcBef>
+              <a:spcAft>
+                <a:spcPts val="0"/>
+              </a:spcAft>
+              <a:buClr>
+                <a:schemeClr val="bg2">
+                  <a:lumMod val="40000"/>
+                  <a:lumOff val="60000"/>
+                </a:schemeClr>
+              </a:buClr>
+              <a:buSzPct val="80000"/>
+              <a:buFont typeface="Wingdings 3" charset="2"/>
+              <a:buChar char=""/>
+              <a:defRPr sz="1400" b="0" i="0" kern="1200">
+                <a:solidFill>
+                  <a:schemeClr val="tx1"/>
+                </a:solidFill>
+                <a:latin typeface="+mj-lt"/>
+                <a:ea typeface="+mj-ea"/>
+                <a:cs typeface="+mj-cs"/>
+              </a:defRPr>
+            </a:lvl9pPr>
+          </a:lstStyle>
+          <a:p>
+            <a:r>
+              <a:rPr lang="de-DE" dirty="0" smtClean="0"/>
+              <a:t>Test-Webshop</a:t>
+            </a:r>
+          </a:p>
+          <a:p>
+            <a:endParaRPr lang="de-DE" dirty="0" smtClean="0"/>
+          </a:p>
+          <a:p>
+            <a:r>
+              <a:rPr lang="de-DE" dirty="0" smtClean="0"/>
+              <a:t>Linux</a:t>
+            </a:r>
+          </a:p>
+          <a:p>
+            <a:endParaRPr lang="de-DE" dirty="0" smtClean="0"/>
+          </a:p>
+          <a:p>
+            <a:r>
+              <a:rPr lang="de-DE" dirty="0" smtClean="0"/>
+              <a:t>Zeigt wichtige Schwachstellen auf</a:t>
+            </a:r>
+          </a:p>
+          <a:p>
+            <a:endParaRPr lang="de-DE" dirty="0" smtClean="0"/>
+          </a:p>
+          <a:p>
+            <a:r>
+              <a:rPr lang="de-DE" dirty="0" smtClean="0"/>
+              <a:t>Können live getestet werden</a:t>
+            </a:r>
+          </a:p>
+          <a:p>
+            <a:endParaRPr lang="de-AT" dirty="0"/>
           </a:p>
         </p:txBody>
       </p:sp>
@@ -7480,13 +7747,13 @@
   <p:clrMapOvr>
     <a:masterClrMapping/>
   </p:clrMapOvr>
-  <mc:AlternateContent xmlns:mc="http://schemas.openxmlformats.org/markup-compatibility/2006">
-    <mc:Choice xmlns:p14="http://schemas.microsoft.com/office/powerpoint/2010/main" Requires="p14">
+  <mc:AlternateContent xmlns:mc="http://schemas.openxmlformats.org/markup-compatibility/2006" xmlns:p14="http://schemas.microsoft.com/office/powerpoint/2010/main">
+    <mc:Choice Requires="p14">
       <p:transition spd="med" p14:dur="700">
         <p:fade/>
       </p:transition>
     </mc:Choice>
-    <mc:Fallback>
+    <mc:Fallback xmlns="">
       <p:transition spd="med">
         <p:fade/>
       </p:transition>
@@ -7548,7 +7815,7 @@
       </p:sp>
       <p:sp>
         <p:nvSpPr>
-          <p:cNvPr id="3" name="Inhaltsplatzhalter 2"/>
+          <p:cNvPr id="4" name="Inhaltsplatzhalter 2"/>
           <p:cNvSpPr>
             <a:spLocks noGrp="1"/>
           </p:cNvSpPr>
@@ -7556,12 +7823,56 @@
             <p:ph idx="1"/>
           </p:nvPr>
         </p:nvSpPr>
-        <p:spPr/>
+        <p:spPr>
+          <a:xfrm>
+            <a:off x="1103312" y="2052918"/>
+            <a:ext cx="8946541" cy="4195481"/>
+          </a:xfrm>
+        </p:spPr>
         <p:txBody>
           <a:bodyPr/>
           <a:lstStyle/>
           <a:p>
-            <a:endParaRPr lang="de-AT"/>
+            <a:endParaRPr lang="de-DE" dirty="0" smtClean="0"/>
+          </a:p>
+          <a:p>
+            <a:endParaRPr lang="de-DE" dirty="0"/>
+          </a:p>
+          <a:p>
+            <a:r>
+              <a:rPr lang="de-AT" dirty="0"/>
+              <a:t>2 User Levels</a:t>
+            </a:r>
+            <a:endParaRPr lang="de-DE" dirty="0"/>
+          </a:p>
+          <a:p>
+            <a:r>
+              <a:rPr lang="de-DE" dirty="0" smtClean="0"/>
+              <a:t>2 Modi</a:t>
+            </a:r>
+            <a:endParaRPr lang="de-DE" dirty="0"/>
+          </a:p>
+          <a:p>
+            <a:r>
+              <a:rPr lang="de-DE" dirty="0" smtClean="0"/>
+              <a:t>Alles in einem Packet</a:t>
+            </a:r>
+          </a:p>
+          <a:p>
+            <a:r>
+              <a:rPr lang="de-DE" dirty="0" smtClean="0"/>
+              <a:t>Apache</a:t>
+            </a:r>
+          </a:p>
+          <a:p>
+            <a:r>
+              <a:rPr lang="de-DE" dirty="0" smtClean="0"/>
+              <a:t>MySQL</a:t>
+            </a:r>
+            <a:endParaRPr lang="de-DE" dirty="0"/>
+          </a:p>
+          <a:p>
+            <a:endParaRPr lang="de-AT" dirty="0"/>
           </a:p>
         </p:txBody>
       </p:sp>
@@ -7575,13 +7886,13 @@
   <p:clrMapOvr>
     <a:masterClrMapping/>
   </p:clrMapOvr>
-  <mc:AlternateContent xmlns:mc="http://schemas.openxmlformats.org/markup-compatibility/2006">
-    <mc:Choice xmlns:p14="http://schemas.microsoft.com/office/powerpoint/2010/main" Requires="p14">
+  <mc:AlternateContent xmlns:mc="http://schemas.openxmlformats.org/markup-compatibility/2006" xmlns:p14="http://schemas.microsoft.com/office/powerpoint/2010/main">
+    <mc:Choice Requires="p14">
       <p:transition spd="med" p14:dur="700">
         <p:fade/>
       </p:transition>
     </mc:Choice>
-    <mc:Fallback>
+    <mc:Fallback xmlns="">
       <p:transition spd="med">
         <p:fade/>
       </p:transition>

</xml_diff>